<commit_message>
Small improvements in Segmentations slides
</commit_message>
<xml_diff>
--- a/Doc/day1_9_SegmentationBasics.pptx
+++ b/Doc/day1_9_SegmentationBasics.pptx
@@ -1162,7 +1162,7 @@
           <a:p>
             <a:fld id="{631D9270-7B54-4D7C-8DD4-CF63D88EDDCF}" type="datetimeFigureOut">
               <a:rPr lang="en-US" smtClean="0"/>
-              <a:t>2019-05-01</a:t>
+              <a:t>2021-06-29</a:t>
             </a:fld>
             <a:endParaRPr lang="en-US"/>
           </a:p>
@@ -1352,7 +1352,7 @@
               <a:pPr>
                 <a:defRPr/>
               </a:pPr>
-              <a:t>2019-05-01</a:t>
+              <a:t>2021-06-29</a:t>
             </a:fld>
             <a:endParaRPr lang="en-US"/>
           </a:p>
@@ -6513,7 +6513,7 @@
         <p:spPr>
           <a:xfrm>
             <a:off x="152400" y="1066800"/>
-            <a:ext cx="4595290" cy="5002920"/>
+            <a:ext cx="4895368" cy="5002920"/>
           </a:xfrm>
         </p:spPr>
         <p:txBody>
@@ -6521,73 +6521,87 @@
           <a:lstStyle/>
           <a:p>
             <a:r>
-              <a:rPr lang="en-CA" b="1" i="1" dirty="0"/>
+              <a:rPr lang="en-CA" sz="2800" b="1" i="1" dirty="0"/>
               <a:t>Segmentation:</a:t>
             </a:r>
             <a:r>
-              <a:rPr lang="en-CA" dirty="0"/>
+              <a:rPr lang="en-CA" sz="2800" dirty="0"/>
               <a:t> MRML node, may contain multiple </a:t>
             </a:r>
             <a:r>
-              <a:rPr lang="en-CA" i="1" dirty="0"/>
+              <a:rPr lang="en-CA" sz="2800" i="1" dirty="0"/>
               <a:t>segments</a:t>
             </a:r>
-          </a:p>
-          <a:p>
-            <a:r>
-              <a:rPr lang="en-CA" dirty="0"/>
+            <a:br>
+              <a:rPr lang="en-CA" sz="2800" i="1" dirty="0"/>
+            </a:br>
+            <a:r>
+              <a:rPr lang="en-CA" sz="2800" dirty="0"/>
+              <a:t>(each segment is a column)</a:t>
+            </a:r>
+          </a:p>
+          <a:p>
+            <a:r>
+              <a:rPr lang="en-CA" sz="2800" dirty="0"/>
               <a:t>Each </a:t>
             </a:r>
             <a:r>
-              <a:rPr lang="en-CA" b="1" i="1" dirty="0"/>
+              <a:rPr lang="en-CA" sz="2800" b="1" i="1" dirty="0"/>
               <a:t>segment</a:t>
             </a:r>
             <a:r>
-              <a:rPr lang="en-CA" b="1" dirty="0"/>
+              <a:rPr lang="en-CA" sz="2800" b="1" dirty="0"/>
               <a:t> </a:t>
             </a:r>
             <a:r>
-              <a:rPr lang="en-CA" dirty="0"/>
+              <a:rPr lang="en-CA" sz="2800" dirty="0"/>
               <a:t>contains multiple </a:t>
             </a:r>
             <a:r>
-              <a:rPr lang="en-CA" i="1" dirty="0"/>
+              <a:rPr lang="en-CA" sz="2800" i="1" dirty="0"/>
               <a:t>representations</a:t>
             </a:r>
-          </a:p>
-          <a:p>
-            <a:r>
-              <a:rPr lang="en-CA" b="1" dirty="0"/>
+            <a:br>
+              <a:rPr lang="en-CA" sz="2800" i="1" dirty="0"/>
+            </a:br>
+            <a:r>
+              <a:rPr lang="en-CA" sz="2800" i="1" dirty="0"/>
+              <a:t>(each representation is a row)</a:t>
+            </a:r>
+          </a:p>
+          <a:p>
+            <a:r>
+              <a:rPr lang="en-CA" sz="2800" b="1" dirty="0"/>
               <a:t>Master representation</a:t>
             </a:r>
             <a:r>
-              <a:rPr lang="en-CA" dirty="0"/>
+              <a:rPr lang="en-CA" sz="2800" dirty="0"/>
               <a:t>:</a:t>
             </a:r>
           </a:p>
           <a:p>
             <a:pPr lvl="1"/>
             <a:r>
-              <a:rPr lang="en-CA" dirty="0"/>
+              <a:rPr lang="en-CA" sz="2400" dirty="0"/>
               <a:t>Editable</a:t>
             </a:r>
           </a:p>
           <a:p>
             <a:pPr lvl="1"/>
             <a:r>
-              <a:rPr lang="en-CA" dirty="0"/>
+              <a:rPr lang="en-CA" sz="2400" dirty="0"/>
               <a:t>All other representations are computed from this</a:t>
             </a:r>
           </a:p>
           <a:p>
             <a:pPr lvl="1"/>
             <a:r>
-              <a:rPr lang="en-CA" dirty="0"/>
+              <a:rPr lang="en-CA" sz="2400" dirty="0"/>
               <a:t>Stored persistently</a:t>
             </a:r>
           </a:p>
           <a:p>
-            <a:endParaRPr lang="en-CA" dirty="0"/>
+            <a:endParaRPr lang="en-CA" sz="2800" dirty="0"/>
           </a:p>
         </p:txBody>
       </p:sp>
@@ -7083,14 +7097,7 @@
             </a:pPr>
             <a:r>
               <a:rPr lang="en-CA" sz="1800" dirty="0"/>
-              <a:t>Segment</a:t>
-            </a:r>
-            <a:br>
-              <a:rPr lang="en-CA" sz="1800" dirty="0"/>
-            </a:br>
-            <a:r>
-              <a:rPr lang="en-CA" sz="1800" dirty="0"/>
-              <a:t>- Tumor</a:t>
+              <a:t>Segment: Tumor</a:t>
             </a:r>
           </a:p>
         </p:txBody>
@@ -7498,7 +7505,7 @@
             </a:pPr>
             <a:r>
               <a:rPr lang="en-CA" sz="1800" dirty="0"/>
-              <a:t>Segment - Brain</a:t>
+              <a:t>Segment: Brain</a:t>
             </a:r>
           </a:p>
         </p:txBody>
@@ -7874,7 +7881,7 @@
         </p:blipFill>
         <p:spPr bwMode="auto">
           <a:xfrm>
-            <a:off x="4540245" y="3810000"/>
+            <a:off x="4092194" y="4267200"/>
             <a:ext cx="367509" cy="365124"/>
           </a:xfrm>
           <a:prstGeom prst="rect">
@@ -7931,7 +7938,7 @@
         </p:blipFill>
         <p:spPr bwMode="auto">
           <a:xfrm>
-            <a:off x="5338856" y="1419072"/>
+            <a:off x="8643030" y="1397319"/>
             <a:ext cx="565533" cy="561864"/>
           </a:xfrm>
           <a:prstGeom prst="rect">
@@ -7959,572 +7966,6 @@
   <p:clrMapOvr>
     <a:masterClrMapping/>
   </p:clrMapOvr>
-  <p:timing>
-    <p:tnLst>
-      <p:par>
-        <p:cTn id="1" dur="indefinite" restart="never" nodeType="tmRoot">
-          <p:childTnLst>
-            <p:seq concurrent="1" nextAc="seek">
-              <p:cTn id="2" dur="indefinite" nodeType="mainSeq">
-                <p:childTnLst>
-                  <p:par>
-                    <p:cTn id="3" fill="hold">
-                      <p:stCondLst>
-                        <p:cond delay="indefinite"/>
-                      </p:stCondLst>
-                      <p:childTnLst>
-                        <p:par>
-                          <p:cTn id="4" fill="hold">
-                            <p:stCondLst>
-                              <p:cond delay="0"/>
-                            </p:stCondLst>
-                            <p:childTnLst>
-                              <p:par>
-                                <p:cTn id="5" presetID="10" presetClass="entr" presetSubtype="0" fill="hold" grpId="0" nodeType="clickEffect">
-                                  <p:stCondLst>
-                                    <p:cond delay="0"/>
-                                  </p:stCondLst>
-                                  <p:childTnLst>
-                                    <p:set>
-                                      <p:cBhvr>
-                                        <p:cTn id="6" dur="1" fill="hold">
-                                          <p:stCondLst>
-                                            <p:cond delay="0"/>
-                                          </p:stCondLst>
-                                        </p:cTn>
-                                        <p:tgtEl>
-                                          <p:spTgt spid="18"/>
-                                        </p:tgtEl>
-                                        <p:attrNameLst>
-                                          <p:attrName>style.visibility</p:attrName>
-                                        </p:attrNameLst>
-                                      </p:cBhvr>
-                                      <p:to>
-                                        <p:strVal val="visible"/>
-                                      </p:to>
-                                    </p:set>
-                                    <p:animEffect transition="in" filter="fade">
-                                      <p:cBhvr>
-                                        <p:cTn id="7" dur="500"/>
-                                        <p:tgtEl>
-                                          <p:spTgt spid="18"/>
-                                        </p:tgtEl>
-                                      </p:cBhvr>
-                                    </p:animEffect>
-                                  </p:childTnLst>
-                                </p:cTn>
-                              </p:par>
-                              <p:par>
-                                <p:cTn id="8" presetID="10" presetClass="entr" presetSubtype="0" fill="hold" grpId="0" nodeType="withEffect">
-                                  <p:stCondLst>
-                                    <p:cond delay="0"/>
-                                  </p:stCondLst>
-                                  <p:childTnLst>
-                                    <p:set>
-                                      <p:cBhvr>
-                                        <p:cTn id="9" dur="1" fill="hold">
-                                          <p:stCondLst>
-                                            <p:cond delay="0"/>
-                                          </p:stCondLst>
-                                        </p:cTn>
-                                        <p:tgtEl>
-                                          <p:spTgt spid="7"/>
-                                        </p:tgtEl>
-                                        <p:attrNameLst>
-                                          <p:attrName>style.visibility</p:attrName>
-                                        </p:attrNameLst>
-                                      </p:cBhvr>
-                                      <p:to>
-                                        <p:strVal val="visible"/>
-                                      </p:to>
-                                    </p:set>
-                                    <p:animEffect transition="in" filter="fade">
-                                      <p:cBhvr>
-                                        <p:cTn id="10" dur="500"/>
-                                        <p:tgtEl>
-                                          <p:spTgt spid="7"/>
-                                        </p:tgtEl>
-                                      </p:cBhvr>
-                                    </p:animEffect>
-                                  </p:childTnLst>
-                                </p:cTn>
-                              </p:par>
-                              <p:par>
-                                <p:cTn id="11" presetID="10" presetClass="entr" presetSubtype="0" fill="hold" nodeType="withEffect">
-                                  <p:stCondLst>
-                                    <p:cond delay="0"/>
-                                  </p:stCondLst>
-                                  <p:childTnLst>
-                                    <p:set>
-                                      <p:cBhvr>
-                                        <p:cTn id="12" dur="1" fill="hold">
-                                          <p:stCondLst>
-                                            <p:cond delay="0"/>
-                                          </p:stCondLst>
-                                        </p:cTn>
-                                        <p:tgtEl>
-                                          <p:spTgt spid="12"/>
-                                        </p:tgtEl>
-                                        <p:attrNameLst>
-                                          <p:attrName>style.visibility</p:attrName>
-                                        </p:attrNameLst>
-                                      </p:cBhvr>
-                                      <p:to>
-                                        <p:strVal val="visible"/>
-                                      </p:to>
-                                    </p:set>
-                                    <p:animEffect transition="in" filter="fade">
-                                      <p:cBhvr>
-                                        <p:cTn id="13" dur="500"/>
-                                        <p:tgtEl>
-                                          <p:spTgt spid="12"/>
-                                        </p:tgtEl>
-                                      </p:cBhvr>
-                                    </p:animEffect>
-                                  </p:childTnLst>
-                                </p:cTn>
-                              </p:par>
-                              <p:par>
-                                <p:cTn id="14" presetID="10" presetClass="entr" presetSubtype="0" fill="hold" nodeType="withEffect">
-                                  <p:stCondLst>
-                                    <p:cond delay="0"/>
-                                  </p:stCondLst>
-                                  <p:childTnLst>
-                                    <p:set>
-                                      <p:cBhvr>
-                                        <p:cTn id="15" dur="1" fill="hold">
-                                          <p:stCondLst>
-                                            <p:cond delay="0"/>
-                                          </p:stCondLst>
-                                        </p:cTn>
-                                        <p:tgtEl>
-                                          <p:spTgt spid="19"/>
-                                        </p:tgtEl>
-                                        <p:attrNameLst>
-                                          <p:attrName>style.visibility</p:attrName>
-                                        </p:attrNameLst>
-                                      </p:cBhvr>
-                                      <p:to>
-                                        <p:strVal val="visible"/>
-                                      </p:to>
-                                    </p:set>
-                                    <p:animEffect transition="in" filter="fade">
-                                      <p:cBhvr>
-                                        <p:cTn id="16" dur="500"/>
-                                        <p:tgtEl>
-                                          <p:spTgt spid="19"/>
-                                        </p:tgtEl>
-                                      </p:cBhvr>
-                                    </p:animEffect>
-                                  </p:childTnLst>
-                                </p:cTn>
-                              </p:par>
-                              <p:par>
-                                <p:cTn id="17" presetID="10" presetClass="entr" presetSubtype="0" fill="hold" nodeType="withEffect">
-                                  <p:stCondLst>
-                                    <p:cond delay="0"/>
-                                  </p:stCondLst>
-                                  <p:childTnLst>
-                                    <p:set>
-                                      <p:cBhvr>
-                                        <p:cTn id="18" dur="1" fill="hold">
-                                          <p:stCondLst>
-                                            <p:cond delay="0"/>
-                                          </p:stCondLst>
-                                        </p:cTn>
-                                        <p:tgtEl>
-                                          <p:spTgt spid="22"/>
-                                        </p:tgtEl>
-                                        <p:attrNameLst>
-                                          <p:attrName>style.visibility</p:attrName>
-                                        </p:attrNameLst>
-                                      </p:cBhvr>
-                                      <p:to>
-                                        <p:strVal val="visible"/>
-                                      </p:to>
-                                    </p:set>
-                                    <p:animEffect transition="in" filter="fade">
-                                      <p:cBhvr>
-                                        <p:cTn id="19" dur="500"/>
-                                        <p:tgtEl>
-                                          <p:spTgt spid="22"/>
-                                        </p:tgtEl>
-                                      </p:cBhvr>
-                                    </p:animEffect>
-                                  </p:childTnLst>
-                                </p:cTn>
-                              </p:par>
-                              <p:par>
-                                <p:cTn id="20" presetID="10" presetClass="entr" presetSubtype="0" fill="hold" nodeType="withEffect">
-                                  <p:stCondLst>
-                                    <p:cond delay="0"/>
-                                  </p:stCondLst>
-                                  <p:childTnLst>
-                                    <p:set>
-                                      <p:cBhvr>
-                                        <p:cTn id="21" dur="1" fill="hold">
-                                          <p:stCondLst>
-                                            <p:cond delay="0"/>
-                                          </p:stCondLst>
-                                        </p:cTn>
-                                        <p:tgtEl>
-                                          <p:spTgt spid="21"/>
-                                        </p:tgtEl>
-                                        <p:attrNameLst>
-                                          <p:attrName>style.visibility</p:attrName>
-                                        </p:attrNameLst>
-                                      </p:cBhvr>
-                                      <p:to>
-                                        <p:strVal val="visible"/>
-                                      </p:to>
-                                    </p:set>
-                                    <p:animEffect transition="in" filter="fade">
-                                      <p:cBhvr>
-                                        <p:cTn id="22" dur="500"/>
-                                        <p:tgtEl>
-                                          <p:spTgt spid="21"/>
-                                        </p:tgtEl>
-                                      </p:cBhvr>
-                                    </p:animEffect>
-                                  </p:childTnLst>
-                                </p:cTn>
-                              </p:par>
-                              <p:par>
-                                <p:cTn id="23" presetID="10" presetClass="entr" presetSubtype="0" fill="hold" grpId="0" nodeType="withEffect">
-                                  <p:stCondLst>
-                                    <p:cond delay="0"/>
-                                  </p:stCondLst>
-                                  <p:childTnLst>
-                                    <p:set>
-                                      <p:cBhvr>
-                                        <p:cTn id="24" dur="1" fill="hold">
-                                          <p:stCondLst>
-                                            <p:cond delay="0"/>
-                                          </p:stCondLst>
-                                        </p:cTn>
-                                        <p:tgtEl>
-                                          <p:spTgt spid="17"/>
-                                        </p:tgtEl>
-                                        <p:attrNameLst>
-                                          <p:attrName>style.visibility</p:attrName>
-                                        </p:attrNameLst>
-                                      </p:cBhvr>
-                                      <p:to>
-                                        <p:strVal val="visible"/>
-                                      </p:to>
-                                    </p:set>
-                                    <p:animEffect transition="in" filter="fade">
-                                      <p:cBhvr>
-                                        <p:cTn id="25" dur="500"/>
-                                        <p:tgtEl>
-                                          <p:spTgt spid="17"/>
-                                        </p:tgtEl>
-                                      </p:cBhvr>
-                                    </p:animEffect>
-                                  </p:childTnLst>
-                                </p:cTn>
-                              </p:par>
-                            </p:childTnLst>
-                          </p:cTn>
-                        </p:par>
-                      </p:childTnLst>
-                    </p:cTn>
-                  </p:par>
-                  <p:par>
-                    <p:cTn id="26" fill="hold">
-                      <p:stCondLst>
-                        <p:cond delay="indefinite"/>
-                      </p:stCondLst>
-                      <p:childTnLst>
-                        <p:par>
-                          <p:cTn id="27" fill="hold">
-                            <p:stCondLst>
-                              <p:cond delay="0"/>
-                            </p:stCondLst>
-                            <p:childTnLst>
-                              <p:par>
-                                <p:cTn id="28" presetID="10" presetClass="entr" presetSubtype="0" fill="hold" grpId="0" nodeType="clickEffect">
-                                  <p:stCondLst>
-                                    <p:cond delay="0"/>
-                                  </p:stCondLst>
-                                  <p:childTnLst>
-                                    <p:set>
-                                      <p:cBhvr>
-                                        <p:cTn id="29" dur="1" fill="hold">
-                                          <p:stCondLst>
-                                            <p:cond delay="0"/>
-                                          </p:stCondLst>
-                                        </p:cTn>
-                                        <p:tgtEl>
-                                          <p:spTgt spid="24"/>
-                                        </p:tgtEl>
-                                        <p:attrNameLst>
-                                          <p:attrName>style.visibility</p:attrName>
-                                        </p:attrNameLst>
-                                      </p:cBhvr>
-                                      <p:to>
-                                        <p:strVal val="visible"/>
-                                      </p:to>
-                                    </p:set>
-                                    <p:animEffect transition="in" filter="fade">
-                                      <p:cBhvr>
-                                        <p:cTn id="30" dur="500"/>
-                                        <p:tgtEl>
-                                          <p:spTgt spid="24"/>
-                                        </p:tgtEl>
-                                      </p:cBhvr>
-                                    </p:animEffect>
-                                  </p:childTnLst>
-                                </p:cTn>
-                              </p:par>
-                              <p:par>
-                                <p:cTn id="31" presetID="10" presetClass="entr" presetSubtype="0" fill="hold" grpId="0" nodeType="withEffect">
-                                  <p:stCondLst>
-                                    <p:cond delay="0"/>
-                                  </p:stCondLst>
-                                  <p:childTnLst>
-                                    <p:set>
-                                      <p:cBhvr>
-                                        <p:cTn id="32" dur="1" fill="hold">
-                                          <p:stCondLst>
-                                            <p:cond delay="0"/>
-                                          </p:stCondLst>
-                                        </p:cTn>
-                                        <p:tgtEl>
-                                          <p:spTgt spid="25"/>
-                                        </p:tgtEl>
-                                        <p:attrNameLst>
-                                          <p:attrName>style.visibility</p:attrName>
-                                        </p:attrNameLst>
-                                      </p:cBhvr>
-                                      <p:to>
-                                        <p:strVal val="visible"/>
-                                      </p:to>
-                                    </p:set>
-                                    <p:animEffect transition="in" filter="fade">
-                                      <p:cBhvr>
-                                        <p:cTn id="33" dur="500"/>
-                                        <p:tgtEl>
-                                          <p:spTgt spid="25"/>
-                                        </p:tgtEl>
-                                      </p:cBhvr>
-                                    </p:animEffect>
-                                  </p:childTnLst>
-                                </p:cTn>
-                              </p:par>
-                              <p:par>
-                                <p:cTn id="34" presetID="10" presetClass="entr" presetSubtype="0" fill="hold" grpId="0" nodeType="withEffect">
-                                  <p:stCondLst>
-                                    <p:cond delay="0"/>
-                                  </p:stCondLst>
-                                  <p:childTnLst>
-                                    <p:set>
-                                      <p:cBhvr>
-                                        <p:cTn id="35" dur="1" fill="hold">
-                                          <p:stCondLst>
-                                            <p:cond delay="0"/>
-                                          </p:stCondLst>
-                                        </p:cTn>
-                                        <p:tgtEl>
-                                          <p:spTgt spid="27"/>
-                                        </p:tgtEl>
-                                        <p:attrNameLst>
-                                          <p:attrName>style.visibility</p:attrName>
-                                        </p:attrNameLst>
-                                      </p:cBhvr>
-                                      <p:to>
-                                        <p:strVal val="visible"/>
-                                      </p:to>
-                                    </p:set>
-                                    <p:animEffect transition="in" filter="fade">
-                                      <p:cBhvr>
-                                        <p:cTn id="36" dur="500"/>
-                                        <p:tgtEl>
-                                          <p:spTgt spid="27"/>
-                                        </p:tgtEl>
-                                      </p:cBhvr>
-                                    </p:animEffect>
-                                  </p:childTnLst>
-                                </p:cTn>
-                              </p:par>
-                              <p:par>
-                                <p:cTn id="37" presetID="10" presetClass="entr" presetSubtype="0" fill="hold" grpId="0" nodeType="withEffect">
-                                  <p:stCondLst>
-                                    <p:cond delay="0"/>
-                                  </p:stCondLst>
-                                  <p:childTnLst>
-                                    <p:set>
-                                      <p:cBhvr>
-                                        <p:cTn id="38" dur="1" fill="hold">
-                                          <p:stCondLst>
-                                            <p:cond delay="0"/>
-                                          </p:stCondLst>
-                                        </p:cTn>
-                                        <p:tgtEl>
-                                          <p:spTgt spid="28"/>
-                                        </p:tgtEl>
-                                        <p:attrNameLst>
-                                          <p:attrName>style.visibility</p:attrName>
-                                        </p:attrNameLst>
-                                      </p:cBhvr>
-                                      <p:to>
-                                        <p:strVal val="visible"/>
-                                      </p:to>
-                                    </p:set>
-                                    <p:animEffect transition="in" filter="fade">
-                                      <p:cBhvr>
-                                        <p:cTn id="39" dur="500"/>
-                                        <p:tgtEl>
-                                          <p:spTgt spid="28"/>
-                                        </p:tgtEl>
-                                      </p:cBhvr>
-                                    </p:animEffect>
-                                  </p:childTnLst>
-                                </p:cTn>
-                              </p:par>
-                            </p:childTnLst>
-                          </p:cTn>
-                        </p:par>
-                      </p:childTnLst>
-                    </p:cTn>
-                  </p:par>
-                  <p:par>
-                    <p:cTn id="40" fill="hold">
-                      <p:stCondLst>
-                        <p:cond delay="indefinite"/>
-                      </p:stCondLst>
-                      <p:childTnLst>
-                        <p:par>
-                          <p:cTn id="41" fill="hold">
-                            <p:stCondLst>
-                              <p:cond delay="0"/>
-                            </p:stCondLst>
-                            <p:childTnLst>
-                              <p:par>
-                                <p:cTn id="42" presetID="10" presetClass="entr" presetSubtype="0" fill="hold" nodeType="clickEffect">
-                                  <p:stCondLst>
-                                    <p:cond delay="0"/>
-                                  </p:stCondLst>
-                                  <p:childTnLst>
-                                    <p:set>
-                                      <p:cBhvr>
-                                        <p:cTn id="43" dur="1" fill="hold">
-                                          <p:stCondLst>
-                                            <p:cond delay="0"/>
-                                          </p:stCondLst>
-                                        </p:cTn>
-                                        <p:tgtEl>
-                                          <p:spTgt spid="26"/>
-                                        </p:tgtEl>
-                                        <p:attrNameLst>
-                                          <p:attrName>style.visibility</p:attrName>
-                                        </p:attrNameLst>
-                                      </p:cBhvr>
-                                      <p:to>
-                                        <p:strVal val="visible"/>
-                                      </p:to>
-                                    </p:set>
-                                    <p:animEffect transition="in" filter="fade">
-                                      <p:cBhvr>
-                                        <p:cTn id="44" dur="500"/>
-                                        <p:tgtEl>
-                                          <p:spTgt spid="26"/>
-                                        </p:tgtEl>
-                                      </p:cBhvr>
-                                    </p:animEffect>
-                                  </p:childTnLst>
-                                </p:cTn>
-                              </p:par>
-                            </p:childTnLst>
-                          </p:cTn>
-                        </p:par>
-                      </p:childTnLst>
-                    </p:cTn>
-                  </p:par>
-                  <p:par>
-                    <p:cTn id="45" fill="hold">
-                      <p:stCondLst>
-                        <p:cond delay="indefinite"/>
-                      </p:stCondLst>
-                      <p:childTnLst>
-                        <p:par>
-                          <p:cTn id="46" fill="hold">
-                            <p:stCondLst>
-                              <p:cond delay="0"/>
-                            </p:stCondLst>
-                            <p:childTnLst>
-                              <p:par>
-                                <p:cTn id="47" presetID="10" presetClass="entr" presetSubtype="0" fill="hold" nodeType="clickEffect">
-                                  <p:stCondLst>
-                                    <p:cond delay="0"/>
-                                  </p:stCondLst>
-                                  <p:childTnLst>
-                                    <p:set>
-                                      <p:cBhvr>
-                                        <p:cTn id="48" dur="1" fill="hold">
-                                          <p:stCondLst>
-                                            <p:cond delay="0"/>
-                                          </p:stCondLst>
-                                        </p:cTn>
-                                        <p:tgtEl>
-                                          <p:spTgt spid="29"/>
-                                        </p:tgtEl>
-                                        <p:attrNameLst>
-                                          <p:attrName>style.visibility</p:attrName>
-                                        </p:attrNameLst>
-                                      </p:cBhvr>
-                                      <p:to>
-                                        <p:strVal val="visible"/>
-                                      </p:to>
-                                    </p:set>
-                                    <p:animEffect transition="in" filter="fade">
-                                      <p:cBhvr>
-                                        <p:cTn id="49" dur="500"/>
-                                        <p:tgtEl>
-                                          <p:spTgt spid="29"/>
-                                        </p:tgtEl>
-                                      </p:cBhvr>
-                                    </p:animEffect>
-                                  </p:childTnLst>
-                                </p:cTn>
-                              </p:par>
-                            </p:childTnLst>
-                          </p:cTn>
-                        </p:par>
-                      </p:childTnLst>
-                    </p:cTn>
-                  </p:par>
-                </p:childTnLst>
-              </p:cTn>
-              <p:prevCondLst>
-                <p:cond evt="onPrev" delay="0">
-                  <p:tgtEl>
-                    <p:sldTgt/>
-                  </p:tgtEl>
-                </p:cond>
-              </p:prevCondLst>
-              <p:nextCondLst>
-                <p:cond evt="onNext" delay="0">
-                  <p:tgtEl>
-                    <p:sldTgt/>
-                  </p:tgtEl>
-                </p:cond>
-              </p:nextCondLst>
-            </p:seq>
-          </p:childTnLst>
-        </p:cTn>
-      </p:par>
-    </p:tnLst>
-    <p:bldLst>
-      <p:bldP spid="17" grpId="0" animBg="1"/>
-      <p:bldP spid="18" grpId="0" animBg="1"/>
-      <p:bldP spid="7" grpId="0" animBg="1"/>
-      <p:bldP spid="24" grpId="0" animBg="1"/>
-      <p:bldP spid="25" grpId="0" animBg="1"/>
-      <p:bldP spid="27" grpId="0" animBg="1"/>
-      <p:bldP spid="28" grpId="0" animBg="1"/>
-    </p:bldLst>
-  </p:timing>
 </p:sld>
 </file>
 
@@ -10651,692 +10092,6 @@
   <p:clrMapOvr>
     <a:masterClrMapping/>
   </p:clrMapOvr>
-  <p:timing>
-    <p:tnLst>
-      <p:par>
-        <p:cTn id="1" dur="indefinite" restart="never" nodeType="tmRoot">
-          <p:childTnLst>
-            <p:seq concurrent="1" nextAc="seek">
-              <p:cTn id="2" dur="indefinite" nodeType="mainSeq">
-                <p:childTnLst>
-                  <p:par>
-                    <p:cTn id="3" fill="hold">
-                      <p:stCondLst>
-                        <p:cond delay="indefinite"/>
-                      </p:stCondLst>
-                      <p:childTnLst>
-                        <p:par>
-                          <p:cTn id="4" fill="hold">
-                            <p:stCondLst>
-                              <p:cond delay="0"/>
-                            </p:stCondLst>
-                            <p:childTnLst>
-                              <p:par>
-                                <p:cTn id="5" presetID="10" presetClass="entr" presetSubtype="0" fill="hold" nodeType="clickEffect">
-                                  <p:stCondLst>
-                                    <p:cond delay="0"/>
-                                  </p:stCondLst>
-                                  <p:childTnLst>
-                                    <p:set>
-                                      <p:cBhvr>
-                                        <p:cTn id="6" dur="1" fill="hold">
-                                          <p:stCondLst>
-                                            <p:cond delay="0"/>
-                                          </p:stCondLst>
-                                        </p:cTn>
-                                        <p:tgtEl>
-                                          <p:spTgt spid="13"/>
-                                        </p:tgtEl>
-                                        <p:attrNameLst>
-                                          <p:attrName>style.visibility</p:attrName>
-                                        </p:attrNameLst>
-                                      </p:cBhvr>
-                                      <p:to>
-                                        <p:strVal val="visible"/>
-                                      </p:to>
-                                    </p:set>
-                                    <p:animEffect transition="in" filter="fade">
-                                      <p:cBhvr>
-                                        <p:cTn id="7" dur="500"/>
-                                        <p:tgtEl>
-                                          <p:spTgt spid="13"/>
-                                        </p:tgtEl>
-                                      </p:cBhvr>
-                                    </p:animEffect>
-                                  </p:childTnLst>
-                                </p:cTn>
-                              </p:par>
-                              <p:par>
-                                <p:cTn id="8" presetID="10" presetClass="entr" presetSubtype="0" fill="hold" nodeType="withEffect">
-                                  <p:stCondLst>
-                                    <p:cond delay="0"/>
-                                  </p:stCondLst>
-                                  <p:childTnLst>
-                                    <p:set>
-                                      <p:cBhvr>
-                                        <p:cTn id="9" dur="1" fill="hold">
-                                          <p:stCondLst>
-                                            <p:cond delay="0"/>
-                                          </p:stCondLst>
-                                        </p:cTn>
-                                        <p:tgtEl>
-                                          <p:spTgt spid="14"/>
-                                        </p:tgtEl>
-                                        <p:attrNameLst>
-                                          <p:attrName>style.visibility</p:attrName>
-                                        </p:attrNameLst>
-                                      </p:cBhvr>
-                                      <p:to>
-                                        <p:strVal val="visible"/>
-                                      </p:to>
-                                    </p:set>
-                                    <p:animEffect transition="in" filter="fade">
-                                      <p:cBhvr>
-                                        <p:cTn id="10" dur="500"/>
-                                        <p:tgtEl>
-                                          <p:spTgt spid="14"/>
-                                        </p:tgtEl>
-                                      </p:cBhvr>
-                                    </p:animEffect>
-                                  </p:childTnLst>
-                                </p:cTn>
-                              </p:par>
-                              <p:par>
-                                <p:cTn id="11" presetID="10" presetClass="entr" presetSubtype="0" fill="hold" nodeType="withEffect">
-                                  <p:stCondLst>
-                                    <p:cond delay="0"/>
-                                  </p:stCondLst>
-                                  <p:childTnLst>
-                                    <p:set>
-                                      <p:cBhvr>
-                                        <p:cTn id="12" dur="1" fill="hold">
-                                          <p:stCondLst>
-                                            <p:cond delay="0"/>
-                                          </p:stCondLst>
-                                        </p:cTn>
-                                        <p:tgtEl>
-                                          <p:spTgt spid="15"/>
-                                        </p:tgtEl>
-                                        <p:attrNameLst>
-                                          <p:attrName>style.visibility</p:attrName>
-                                        </p:attrNameLst>
-                                      </p:cBhvr>
-                                      <p:to>
-                                        <p:strVal val="visible"/>
-                                      </p:to>
-                                    </p:set>
-                                    <p:animEffect transition="in" filter="fade">
-                                      <p:cBhvr>
-                                        <p:cTn id="13" dur="500"/>
-                                        <p:tgtEl>
-                                          <p:spTgt spid="15"/>
-                                        </p:tgtEl>
-                                      </p:cBhvr>
-                                    </p:animEffect>
-                                  </p:childTnLst>
-                                </p:cTn>
-                              </p:par>
-                            </p:childTnLst>
-                          </p:cTn>
-                        </p:par>
-                      </p:childTnLst>
-                    </p:cTn>
-                  </p:par>
-                  <p:par>
-                    <p:cTn id="14" fill="hold">
-                      <p:stCondLst>
-                        <p:cond delay="indefinite"/>
-                      </p:stCondLst>
-                      <p:childTnLst>
-                        <p:par>
-                          <p:cTn id="15" fill="hold">
-                            <p:stCondLst>
-                              <p:cond delay="0"/>
-                            </p:stCondLst>
-                            <p:childTnLst>
-                              <p:par>
-                                <p:cTn id="16" presetID="10" presetClass="entr" presetSubtype="0" fill="hold" grpId="0" nodeType="clickEffect">
-                                  <p:stCondLst>
-                                    <p:cond delay="0"/>
-                                  </p:stCondLst>
-                                  <p:childTnLst>
-                                    <p:set>
-                                      <p:cBhvr>
-                                        <p:cTn id="17" dur="1" fill="hold">
-                                          <p:stCondLst>
-                                            <p:cond delay="0"/>
-                                          </p:stCondLst>
-                                        </p:cTn>
-                                        <p:tgtEl>
-                                          <p:spTgt spid="7"/>
-                                        </p:tgtEl>
-                                        <p:attrNameLst>
-                                          <p:attrName>style.visibility</p:attrName>
-                                        </p:attrNameLst>
-                                      </p:cBhvr>
-                                      <p:to>
-                                        <p:strVal val="visible"/>
-                                      </p:to>
-                                    </p:set>
-                                    <p:animEffect transition="in" filter="fade">
-                                      <p:cBhvr>
-                                        <p:cTn id="18" dur="500"/>
-                                        <p:tgtEl>
-                                          <p:spTgt spid="7"/>
-                                        </p:tgtEl>
-                                      </p:cBhvr>
-                                    </p:animEffect>
-                                  </p:childTnLst>
-                                </p:cTn>
-                              </p:par>
-                              <p:par>
-                                <p:cTn id="19" presetID="10" presetClass="entr" presetSubtype="0" fill="hold" nodeType="withEffect">
-                                  <p:stCondLst>
-                                    <p:cond delay="0"/>
-                                  </p:stCondLst>
-                                  <p:childTnLst>
-                                    <p:set>
-                                      <p:cBhvr>
-                                        <p:cTn id="20" dur="1" fill="hold">
-                                          <p:stCondLst>
-                                            <p:cond delay="0"/>
-                                          </p:stCondLst>
-                                        </p:cTn>
-                                        <p:tgtEl>
-                                          <p:spTgt spid="11"/>
-                                        </p:tgtEl>
-                                        <p:attrNameLst>
-                                          <p:attrName>style.visibility</p:attrName>
-                                        </p:attrNameLst>
-                                      </p:cBhvr>
-                                      <p:to>
-                                        <p:strVal val="visible"/>
-                                      </p:to>
-                                    </p:set>
-                                    <p:animEffect transition="in" filter="fade">
-                                      <p:cBhvr>
-                                        <p:cTn id="21" dur="500"/>
-                                        <p:tgtEl>
-                                          <p:spTgt spid="11"/>
-                                        </p:tgtEl>
-                                      </p:cBhvr>
-                                    </p:animEffect>
-                                  </p:childTnLst>
-                                </p:cTn>
-                              </p:par>
-                              <p:par>
-                                <p:cTn id="22" presetID="10" presetClass="entr" presetSubtype="0" fill="hold" nodeType="withEffect">
-                                  <p:stCondLst>
-                                    <p:cond delay="0"/>
-                                  </p:stCondLst>
-                                  <p:childTnLst>
-                                    <p:set>
-                                      <p:cBhvr>
-                                        <p:cTn id="23" dur="1" fill="hold">
-                                          <p:stCondLst>
-                                            <p:cond delay="0"/>
-                                          </p:stCondLst>
-                                        </p:cTn>
-                                        <p:tgtEl>
-                                          <p:spTgt spid="12"/>
-                                        </p:tgtEl>
-                                        <p:attrNameLst>
-                                          <p:attrName>style.visibility</p:attrName>
-                                        </p:attrNameLst>
-                                      </p:cBhvr>
-                                      <p:to>
-                                        <p:strVal val="visible"/>
-                                      </p:to>
-                                    </p:set>
-                                    <p:animEffect transition="in" filter="fade">
-                                      <p:cBhvr>
-                                        <p:cTn id="24" dur="500"/>
-                                        <p:tgtEl>
-                                          <p:spTgt spid="12"/>
-                                        </p:tgtEl>
-                                      </p:cBhvr>
-                                    </p:animEffect>
-                                  </p:childTnLst>
-                                </p:cTn>
-                              </p:par>
-                            </p:childTnLst>
-                          </p:cTn>
-                        </p:par>
-                      </p:childTnLst>
-                    </p:cTn>
-                  </p:par>
-                  <p:par>
-                    <p:cTn id="25" fill="hold">
-                      <p:stCondLst>
-                        <p:cond delay="indefinite"/>
-                      </p:stCondLst>
-                      <p:childTnLst>
-                        <p:par>
-                          <p:cTn id="26" fill="hold">
-                            <p:stCondLst>
-                              <p:cond delay="0"/>
-                            </p:stCondLst>
-                            <p:childTnLst>
-                              <p:par>
-                                <p:cTn id="27" presetID="30" presetClass="emph" presetSubtype="0" fill="hold" nodeType="clickEffect">
-                                  <p:stCondLst>
-                                    <p:cond delay="0"/>
-                                  </p:stCondLst>
-                                  <p:childTnLst>
-                                    <p:animClr clrSpc="hsl" dir="cw">
-                                      <p:cBhvr override="childStyle">
-                                        <p:cTn id="28" dur="500" fill="hold"/>
-                                        <p:tgtEl>
-                                          <p:spTgt spid="11"/>
-                                        </p:tgtEl>
-                                        <p:attrNameLst>
-                                          <p:attrName>style.color</p:attrName>
-                                        </p:attrNameLst>
-                                      </p:cBhvr>
-                                      <p:by>
-                                        <p:hsl h="0" s="12549" l="25098"/>
-                                      </p:by>
-                                    </p:animClr>
-                                    <p:animClr clrSpc="hsl" dir="cw">
-                                      <p:cBhvr>
-                                        <p:cTn id="29" dur="500" fill="hold"/>
-                                        <p:tgtEl>
-                                          <p:spTgt spid="11"/>
-                                        </p:tgtEl>
-                                        <p:attrNameLst>
-                                          <p:attrName>fillcolor</p:attrName>
-                                        </p:attrNameLst>
-                                      </p:cBhvr>
-                                      <p:by>
-                                        <p:hsl h="0" s="12549" l="25098"/>
-                                      </p:by>
-                                    </p:animClr>
-                                    <p:animClr clrSpc="hsl" dir="cw">
-                                      <p:cBhvr>
-                                        <p:cTn id="30" dur="500" fill="hold"/>
-                                        <p:tgtEl>
-                                          <p:spTgt spid="11"/>
-                                        </p:tgtEl>
-                                        <p:attrNameLst>
-                                          <p:attrName>stroke.color</p:attrName>
-                                        </p:attrNameLst>
-                                      </p:cBhvr>
-                                      <p:by>
-                                        <p:hsl h="0" s="12549" l="25098"/>
-                                      </p:by>
-                                    </p:animClr>
-                                    <p:set>
-                                      <p:cBhvr>
-                                        <p:cTn id="31" dur="500" fill="hold"/>
-                                        <p:tgtEl>
-                                          <p:spTgt spid="11"/>
-                                        </p:tgtEl>
-                                        <p:attrNameLst>
-                                          <p:attrName>fill.type</p:attrName>
-                                        </p:attrNameLst>
-                                      </p:cBhvr>
-                                      <p:to>
-                                        <p:strVal val="solid"/>
-                                      </p:to>
-                                    </p:set>
-                                  </p:childTnLst>
-                                </p:cTn>
-                              </p:par>
-                              <p:par>
-                                <p:cTn id="32" presetID="24" presetClass="emph" presetSubtype="0" fill="hold" nodeType="withEffect">
-                                  <p:stCondLst>
-                                    <p:cond delay="0"/>
-                                  </p:stCondLst>
-                                  <p:childTnLst>
-                                    <p:animClr clrSpc="hsl" dir="cw">
-                                      <p:cBhvr override="childStyle">
-                                        <p:cTn id="33" dur="500" fill="hold"/>
-                                        <p:tgtEl>
-                                          <p:spTgt spid="13"/>
-                                        </p:tgtEl>
-                                        <p:attrNameLst>
-                                          <p:attrName>style.color</p:attrName>
-                                        </p:attrNameLst>
-                                      </p:cBhvr>
-                                      <p:by>
-                                        <p:hsl h="0" s="-12549" l="-25098"/>
-                                      </p:by>
-                                    </p:animClr>
-                                    <p:animClr clrSpc="hsl" dir="cw">
-                                      <p:cBhvr>
-                                        <p:cTn id="34" dur="500" fill="hold"/>
-                                        <p:tgtEl>
-                                          <p:spTgt spid="13"/>
-                                        </p:tgtEl>
-                                        <p:attrNameLst>
-                                          <p:attrName>fillcolor</p:attrName>
-                                        </p:attrNameLst>
-                                      </p:cBhvr>
-                                      <p:by>
-                                        <p:hsl h="0" s="-12549" l="-25098"/>
-                                      </p:by>
-                                    </p:animClr>
-                                    <p:animClr clrSpc="hsl" dir="cw">
-                                      <p:cBhvr>
-                                        <p:cTn id="35" dur="500" fill="hold"/>
-                                        <p:tgtEl>
-                                          <p:spTgt spid="13"/>
-                                        </p:tgtEl>
-                                        <p:attrNameLst>
-                                          <p:attrName>stroke.color</p:attrName>
-                                        </p:attrNameLst>
-                                      </p:cBhvr>
-                                      <p:by>
-                                        <p:hsl h="0" s="-12549" l="-25098"/>
-                                      </p:by>
-                                    </p:animClr>
-                                    <p:set>
-                                      <p:cBhvr>
-                                        <p:cTn id="36" dur="500" fill="hold"/>
-                                        <p:tgtEl>
-                                          <p:spTgt spid="13"/>
-                                        </p:tgtEl>
-                                        <p:attrNameLst>
-                                          <p:attrName>fill.type</p:attrName>
-                                        </p:attrNameLst>
-                                      </p:cBhvr>
-                                      <p:to>
-                                        <p:strVal val="solid"/>
-                                      </p:to>
-                                    </p:set>
-                                  </p:childTnLst>
-                                </p:cTn>
-                              </p:par>
-                              <p:par>
-                                <p:cTn id="37" presetID="24" presetClass="emph" presetSubtype="0" fill="hold" nodeType="withEffect">
-                                  <p:stCondLst>
-                                    <p:cond delay="0"/>
-                                  </p:stCondLst>
-                                  <p:childTnLst>
-                                    <p:animClr clrSpc="hsl" dir="cw">
-                                      <p:cBhvr override="childStyle">
-                                        <p:cTn id="38" dur="500" fill="hold"/>
-                                        <p:tgtEl>
-                                          <p:spTgt spid="15"/>
-                                        </p:tgtEl>
-                                        <p:attrNameLst>
-                                          <p:attrName>style.color</p:attrName>
-                                        </p:attrNameLst>
-                                      </p:cBhvr>
-                                      <p:by>
-                                        <p:hsl h="0" s="-12549" l="-25098"/>
-                                      </p:by>
-                                    </p:animClr>
-                                    <p:animClr clrSpc="hsl" dir="cw">
-                                      <p:cBhvr>
-                                        <p:cTn id="39" dur="500" fill="hold"/>
-                                        <p:tgtEl>
-                                          <p:spTgt spid="15"/>
-                                        </p:tgtEl>
-                                        <p:attrNameLst>
-                                          <p:attrName>fillcolor</p:attrName>
-                                        </p:attrNameLst>
-                                      </p:cBhvr>
-                                      <p:by>
-                                        <p:hsl h="0" s="-12549" l="-25098"/>
-                                      </p:by>
-                                    </p:animClr>
-                                    <p:animClr clrSpc="hsl" dir="cw">
-                                      <p:cBhvr>
-                                        <p:cTn id="40" dur="500" fill="hold"/>
-                                        <p:tgtEl>
-                                          <p:spTgt spid="15"/>
-                                        </p:tgtEl>
-                                        <p:attrNameLst>
-                                          <p:attrName>stroke.color</p:attrName>
-                                        </p:attrNameLst>
-                                      </p:cBhvr>
-                                      <p:by>
-                                        <p:hsl h="0" s="-12549" l="-25098"/>
-                                      </p:by>
-                                    </p:animClr>
-                                    <p:set>
-                                      <p:cBhvr>
-                                        <p:cTn id="41" dur="500" fill="hold"/>
-                                        <p:tgtEl>
-                                          <p:spTgt spid="15"/>
-                                        </p:tgtEl>
-                                        <p:attrNameLst>
-                                          <p:attrName>fill.type</p:attrName>
-                                        </p:attrNameLst>
-                                      </p:cBhvr>
-                                      <p:to>
-                                        <p:strVal val="solid"/>
-                                      </p:to>
-                                    </p:set>
-                                  </p:childTnLst>
-                                </p:cTn>
-                              </p:par>
-                              <p:par>
-                                <p:cTn id="42" presetID="10" presetClass="entr" presetSubtype="0" fill="hold" nodeType="withEffect">
-                                  <p:stCondLst>
-                                    <p:cond delay="0"/>
-                                  </p:stCondLst>
-                                  <p:childTnLst>
-                                    <p:set>
-                                      <p:cBhvr>
-                                        <p:cTn id="43" dur="1" fill="hold">
-                                          <p:stCondLst>
-                                            <p:cond delay="0"/>
-                                          </p:stCondLst>
-                                        </p:cTn>
-                                        <p:tgtEl>
-                                          <p:spTgt spid="16"/>
-                                        </p:tgtEl>
-                                        <p:attrNameLst>
-                                          <p:attrName>style.visibility</p:attrName>
-                                        </p:attrNameLst>
-                                      </p:cBhvr>
-                                      <p:to>
-                                        <p:strVal val="visible"/>
-                                      </p:to>
-                                    </p:set>
-                                    <p:animEffect transition="in" filter="fade">
-                                      <p:cBhvr>
-                                        <p:cTn id="44" dur="500"/>
-                                        <p:tgtEl>
-                                          <p:spTgt spid="16"/>
-                                        </p:tgtEl>
-                                      </p:cBhvr>
-                                    </p:animEffect>
-                                  </p:childTnLst>
-                                </p:cTn>
-                              </p:par>
-                            </p:childTnLst>
-                          </p:cTn>
-                        </p:par>
-                      </p:childTnLst>
-                    </p:cTn>
-                  </p:par>
-                  <p:par>
-                    <p:cTn id="45" fill="hold">
-                      <p:stCondLst>
-                        <p:cond delay="indefinite"/>
-                      </p:stCondLst>
-                      <p:childTnLst>
-                        <p:par>
-                          <p:cTn id="46" fill="hold">
-                            <p:stCondLst>
-                              <p:cond delay="0"/>
-                            </p:stCondLst>
-                            <p:childTnLst>
-                              <p:par>
-                                <p:cTn id="47" presetID="10" presetClass="entr" presetSubtype="0" fill="hold" nodeType="clickEffect">
-                                  <p:stCondLst>
-                                    <p:cond delay="0"/>
-                                  </p:stCondLst>
-                                  <p:childTnLst>
-                                    <p:set>
-                                      <p:cBhvr>
-                                        <p:cTn id="48" dur="1" fill="hold">
-                                          <p:stCondLst>
-                                            <p:cond delay="0"/>
-                                          </p:stCondLst>
-                                        </p:cTn>
-                                        <p:tgtEl>
-                                          <p:spTgt spid="18"/>
-                                        </p:tgtEl>
-                                        <p:attrNameLst>
-                                          <p:attrName>style.visibility</p:attrName>
-                                        </p:attrNameLst>
-                                      </p:cBhvr>
-                                      <p:to>
-                                        <p:strVal val="visible"/>
-                                      </p:to>
-                                    </p:set>
-                                    <p:animEffect transition="in" filter="fade">
-                                      <p:cBhvr>
-                                        <p:cTn id="49" dur="500"/>
-                                        <p:tgtEl>
-                                          <p:spTgt spid="18"/>
-                                        </p:tgtEl>
-                                      </p:cBhvr>
-                                    </p:animEffect>
-                                  </p:childTnLst>
-                                </p:cTn>
-                              </p:par>
-                              <p:par>
-                                <p:cTn id="50" presetID="10" presetClass="entr" presetSubtype="0" fill="hold" nodeType="withEffect">
-                                  <p:stCondLst>
-                                    <p:cond delay="0"/>
-                                  </p:stCondLst>
-                                  <p:childTnLst>
-                                    <p:set>
-                                      <p:cBhvr>
-                                        <p:cTn id="51" dur="1" fill="hold">
-                                          <p:stCondLst>
-                                            <p:cond delay="0"/>
-                                          </p:stCondLst>
-                                        </p:cTn>
-                                        <p:tgtEl>
-                                          <p:spTgt spid="19"/>
-                                        </p:tgtEl>
-                                        <p:attrNameLst>
-                                          <p:attrName>style.visibility</p:attrName>
-                                        </p:attrNameLst>
-                                      </p:cBhvr>
-                                      <p:to>
-                                        <p:strVal val="visible"/>
-                                      </p:to>
-                                    </p:set>
-                                    <p:animEffect transition="in" filter="fade">
-                                      <p:cBhvr>
-                                        <p:cTn id="52" dur="500"/>
-                                        <p:tgtEl>
-                                          <p:spTgt spid="19"/>
-                                        </p:tgtEl>
-                                      </p:cBhvr>
-                                    </p:animEffect>
-                                  </p:childTnLst>
-                                </p:cTn>
-                              </p:par>
-                              <p:par>
-                                <p:cTn id="53" presetID="10" presetClass="entr" presetSubtype="0" fill="hold" nodeType="withEffect">
-                                  <p:stCondLst>
-                                    <p:cond delay="0"/>
-                                  </p:stCondLst>
-                                  <p:childTnLst>
-                                    <p:set>
-                                      <p:cBhvr>
-                                        <p:cTn id="54" dur="1" fill="hold">
-                                          <p:stCondLst>
-                                            <p:cond delay="0"/>
-                                          </p:stCondLst>
-                                        </p:cTn>
-                                        <p:tgtEl>
-                                          <p:spTgt spid="22"/>
-                                        </p:tgtEl>
-                                        <p:attrNameLst>
-                                          <p:attrName>style.visibility</p:attrName>
-                                        </p:attrNameLst>
-                                      </p:cBhvr>
-                                      <p:to>
-                                        <p:strVal val="visible"/>
-                                      </p:to>
-                                    </p:set>
-                                    <p:animEffect transition="in" filter="fade">
-                                      <p:cBhvr>
-                                        <p:cTn id="55" dur="500"/>
-                                        <p:tgtEl>
-                                          <p:spTgt spid="22"/>
-                                        </p:tgtEl>
-                                      </p:cBhvr>
-                                    </p:animEffect>
-                                  </p:childTnLst>
-                                </p:cTn>
-                              </p:par>
-                              <p:par>
-                                <p:cTn id="56" presetID="10" presetClass="entr" presetSubtype="0" fill="hold" grpId="0" nodeType="withEffect">
-                                  <p:stCondLst>
-                                    <p:cond delay="0"/>
-                                  </p:stCondLst>
-                                  <p:childTnLst>
-                                    <p:set>
-                                      <p:cBhvr>
-                                        <p:cTn id="57" dur="1" fill="hold">
-                                          <p:stCondLst>
-                                            <p:cond delay="0"/>
-                                          </p:stCondLst>
-                                        </p:cTn>
-                                        <p:tgtEl>
-                                          <p:spTgt spid="20"/>
-                                        </p:tgtEl>
-                                        <p:attrNameLst>
-                                          <p:attrName>style.visibility</p:attrName>
-                                        </p:attrNameLst>
-                                      </p:cBhvr>
-                                      <p:to>
-                                        <p:strVal val="visible"/>
-                                      </p:to>
-                                    </p:set>
-                                    <p:animEffect transition="in" filter="fade">
-                                      <p:cBhvr>
-                                        <p:cTn id="58" dur="500"/>
-                                        <p:tgtEl>
-                                          <p:spTgt spid="20"/>
-                                        </p:tgtEl>
-                                      </p:cBhvr>
-                                    </p:animEffect>
-                                  </p:childTnLst>
-                                </p:cTn>
-                              </p:par>
-                            </p:childTnLst>
-                          </p:cTn>
-                        </p:par>
-                      </p:childTnLst>
-                    </p:cTn>
-                  </p:par>
-                </p:childTnLst>
-              </p:cTn>
-              <p:prevCondLst>
-                <p:cond evt="onPrev" delay="0">
-                  <p:tgtEl>
-                    <p:sldTgt/>
-                  </p:tgtEl>
-                </p:cond>
-              </p:prevCondLst>
-              <p:nextCondLst>
-                <p:cond evt="onNext" delay="0">
-                  <p:tgtEl>
-                    <p:sldTgt/>
-                  </p:tgtEl>
-                </p:cond>
-              </p:nextCondLst>
-            </p:seq>
-          </p:childTnLst>
-        </p:cTn>
-      </p:par>
-    </p:tnLst>
-    <p:bldLst>
-      <p:bldP spid="7" grpId="0" animBg="1"/>
-      <p:bldP spid="20" grpId="0" animBg="1"/>
-    </p:bldLst>
-  </p:timing>
 </p:sld>
 </file>
 
@@ -11700,272 +10455,6 @@
   <p:clrMapOvr>
     <a:masterClrMapping/>
   </p:clrMapOvr>
-  <p:timing>
-    <p:tnLst>
-      <p:par>
-        <p:cTn id="1" dur="indefinite" restart="never" nodeType="tmRoot">
-          <p:childTnLst>
-            <p:seq concurrent="1" nextAc="seek">
-              <p:cTn id="2" dur="indefinite" nodeType="mainSeq">
-                <p:childTnLst>
-                  <p:par>
-                    <p:cTn id="3" fill="hold">
-                      <p:stCondLst>
-                        <p:cond delay="indefinite"/>
-                      </p:stCondLst>
-                      <p:childTnLst>
-                        <p:par>
-                          <p:cTn id="4" fill="hold">
-                            <p:stCondLst>
-                              <p:cond delay="0"/>
-                            </p:stCondLst>
-                            <p:childTnLst>
-                              <p:par>
-                                <p:cTn id="5" presetID="10" presetClass="entr" presetSubtype="0" fill="hold" nodeType="clickEffect">
-                                  <p:stCondLst>
-                                    <p:cond delay="0"/>
-                                  </p:stCondLst>
-                                  <p:childTnLst>
-                                    <p:set>
-                                      <p:cBhvr>
-                                        <p:cTn id="6" dur="1" fill="hold">
-                                          <p:stCondLst>
-                                            <p:cond delay="0"/>
-                                          </p:stCondLst>
-                                        </p:cTn>
-                                        <p:tgtEl>
-                                          <p:spTgt spid="29"/>
-                                        </p:tgtEl>
-                                        <p:attrNameLst>
-                                          <p:attrName>style.visibility</p:attrName>
-                                        </p:attrNameLst>
-                                      </p:cBhvr>
-                                      <p:to>
-                                        <p:strVal val="visible"/>
-                                      </p:to>
-                                    </p:set>
-                                    <p:animEffect transition="in" filter="fade">
-                                      <p:cBhvr>
-                                        <p:cTn id="7" dur="500"/>
-                                        <p:tgtEl>
-                                          <p:spTgt spid="29"/>
-                                        </p:tgtEl>
-                                      </p:cBhvr>
-                                    </p:animEffect>
-                                  </p:childTnLst>
-                                </p:cTn>
-                              </p:par>
-                              <p:par>
-                                <p:cTn id="8" presetID="24" presetClass="emph" presetSubtype="0" fill="hold" nodeType="withEffect">
-                                  <p:stCondLst>
-                                    <p:cond delay="0"/>
-                                  </p:stCondLst>
-                                  <p:childTnLst>
-                                    <p:animClr clrSpc="hsl" dir="cw">
-                                      <p:cBhvr override="childStyle">
-                                        <p:cTn id="9" dur="500" fill="hold"/>
-                                        <p:tgtEl>
-                                          <p:spTgt spid="29"/>
-                                        </p:tgtEl>
-                                        <p:attrNameLst>
-                                          <p:attrName>style.color</p:attrName>
-                                        </p:attrNameLst>
-                                      </p:cBhvr>
-                                      <p:by>
-                                        <p:hsl h="0" s="-12549" l="-25098"/>
-                                      </p:by>
-                                    </p:animClr>
-                                    <p:animClr clrSpc="hsl" dir="cw">
-                                      <p:cBhvr>
-                                        <p:cTn id="10" dur="500" fill="hold"/>
-                                        <p:tgtEl>
-                                          <p:spTgt spid="29"/>
-                                        </p:tgtEl>
-                                        <p:attrNameLst>
-                                          <p:attrName>fillcolor</p:attrName>
-                                        </p:attrNameLst>
-                                      </p:cBhvr>
-                                      <p:by>
-                                        <p:hsl h="0" s="-12549" l="-25098"/>
-                                      </p:by>
-                                    </p:animClr>
-                                    <p:animClr clrSpc="hsl" dir="cw">
-                                      <p:cBhvr>
-                                        <p:cTn id="11" dur="500" fill="hold"/>
-                                        <p:tgtEl>
-                                          <p:spTgt spid="29"/>
-                                        </p:tgtEl>
-                                        <p:attrNameLst>
-                                          <p:attrName>stroke.color</p:attrName>
-                                        </p:attrNameLst>
-                                      </p:cBhvr>
-                                      <p:by>
-                                        <p:hsl h="0" s="-12549" l="-25098"/>
-                                      </p:by>
-                                    </p:animClr>
-                                    <p:set>
-                                      <p:cBhvr>
-                                        <p:cTn id="12" dur="500" fill="hold"/>
-                                        <p:tgtEl>
-                                          <p:spTgt spid="29"/>
-                                        </p:tgtEl>
-                                        <p:attrNameLst>
-                                          <p:attrName>fill.type</p:attrName>
-                                        </p:attrNameLst>
-                                      </p:cBhvr>
-                                      <p:to>
-                                        <p:strVal val="solid"/>
-                                      </p:to>
-                                    </p:set>
-                                  </p:childTnLst>
-                                </p:cTn>
-                              </p:par>
-                            </p:childTnLst>
-                          </p:cTn>
-                        </p:par>
-                      </p:childTnLst>
-                    </p:cTn>
-                  </p:par>
-                  <p:par>
-                    <p:cTn id="13" fill="hold">
-                      <p:stCondLst>
-                        <p:cond delay="indefinite"/>
-                      </p:stCondLst>
-                      <p:childTnLst>
-                        <p:par>
-                          <p:cTn id="14" fill="hold">
-                            <p:stCondLst>
-                              <p:cond delay="0"/>
-                            </p:stCondLst>
-                            <p:childTnLst>
-                              <p:par>
-                                <p:cTn id="15" presetID="10" presetClass="entr" presetSubtype="0" fill="hold" nodeType="clickEffect">
-                                  <p:stCondLst>
-                                    <p:cond delay="0"/>
-                                  </p:stCondLst>
-                                  <p:childTnLst>
-                                    <p:set>
-                                      <p:cBhvr>
-                                        <p:cTn id="16" dur="1" fill="hold">
-                                          <p:stCondLst>
-                                            <p:cond delay="0"/>
-                                          </p:stCondLst>
-                                        </p:cTn>
-                                        <p:tgtEl>
-                                          <p:spTgt spid="30"/>
-                                        </p:tgtEl>
-                                        <p:attrNameLst>
-                                          <p:attrName>style.visibility</p:attrName>
-                                        </p:attrNameLst>
-                                      </p:cBhvr>
-                                      <p:to>
-                                        <p:strVal val="visible"/>
-                                      </p:to>
-                                    </p:set>
-                                    <p:animEffect transition="in" filter="fade">
-                                      <p:cBhvr>
-                                        <p:cTn id="17" dur="500"/>
-                                        <p:tgtEl>
-                                          <p:spTgt spid="30"/>
-                                        </p:tgtEl>
-                                      </p:cBhvr>
-                                    </p:animEffect>
-                                  </p:childTnLst>
-                                </p:cTn>
-                              </p:par>
-                              <p:par>
-                                <p:cTn id="18" presetID="24" presetClass="emph" presetSubtype="0" fill="hold" nodeType="withEffect">
-                                  <p:stCondLst>
-                                    <p:cond delay="0"/>
-                                  </p:stCondLst>
-                                  <p:childTnLst>
-                                    <p:animClr clrSpc="hsl" dir="cw">
-                                      <p:cBhvr override="childStyle">
-                                        <p:cTn id="19" dur="500" fill="hold"/>
-                                        <p:tgtEl>
-                                          <p:spTgt spid="30"/>
-                                        </p:tgtEl>
-                                        <p:attrNameLst>
-                                          <p:attrName>style.color</p:attrName>
-                                        </p:attrNameLst>
-                                      </p:cBhvr>
-                                      <p:by>
-                                        <p:hsl h="0" s="-12549" l="-25098"/>
-                                      </p:by>
-                                    </p:animClr>
-                                    <p:animClr clrSpc="hsl" dir="cw">
-                                      <p:cBhvr>
-                                        <p:cTn id="20" dur="500" fill="hold"/>
-                                        <p:tgtEl>
-                                          <p:spTgt spid="30"/>
-                                        </p:tgtEl>
-                                        <p:attrNameLst>
-                                          <p:attrName>fillcolor</p:attrName>
-                                        </p:attrNameLst>
-                                      </p:cBhvr>
-                                      <p:by>
-                                        <p:hsl h="0" s="-12549" l="-25098"/>
-                                      </p:by>
-                                    </p:animClr>
-                                    <p:animClr clrSpc="hsl" dir="cw">
-                                      <p:cBhvr>
-                                        <p:cTn id="21" dur="500" fill="hold"/>
-                                        <p:tgtEl>
-                                          <p:spTgt spid="30"/>
-                                        </p:tgtEl>
-                                        <p:attrNameLst>
-                                          <p:attrName>stroke.color</p:attrName>
-                                        </p:attrNameLst>
-                                      </p:cBhvr>
-                                      <p:by>
-                                        <p:hsl h="0" s="-12549" l="-25098"/>
-                                      </p:by>
-                                    </p:animClr>
-                                    <p:set>
-                                      <p:cBhvr>
-                                        <p:cTn id="22" dur="500" fill="hold"/>
-                                        <p:tgtEl>
-                                          <p:spTgt spid="30"/>
-                                        </p:tgtEl>
-                                        <p:attrNameLst>
-                                          <p:attrName>fill.type</p:attrName>
-                                        </p:attrNameLst>
-                                      </p:cBhvr>
-                                      <p:to>
-                                        <p:strVal val="solid"/>
-                                      </p:to>
-                                    </p:set>
-                                  </p:childTnLst>
-                                </p:cTn>
-                              </p:par>
-                            </p:childTnLst>
-                          </p:cTn>
-                        </p:par>
-                      </p:childTnLst>
-                    </p:cTn>
-                  </p:par>
-                </p:childTnLst>
-              </p:cTn>
-              <p:prevCondLst>
-                <p:cond evt="onPrev" delay="0">
-                  <p:tgtEl>
-                    <p:sldTgt/>
-                  </p:tgtEl>
-                </p:cond>
-              </p:prevCondLst>
-              <p:nextCondLst>
-                <p:cond evt="onNext" delay="0">
-                  <p:tgtEl>
-                    <p:sldTgt/>
-                  </p:tgtEl>
-                </p:cond>
-              </p:nextCondLst>
-            </p:seq>
-          </p:childTnLst>
-        </p:cTn>
-      </p:par>
-    </p:tnLst>
-  </p:timing>
 </p:sld>
 </file>
 

</xml_diff>